<commit_message>
project structure: fetchers and teacher app
</commit_message>
<xml_diff>
--- a/Reports/architecture-diagram.pptx
+++ b/Reports/architecture-diagram.pptx
@@ -261,7 +261,7 @@
           <a:p>
             <a:fld id="{C5DAE33B-FCF7-8349-8336-02F3E321B06E}" type="datetimeFigureOut">
               <a:rPr lang="en-PT" smtClean="0"/>
-              <a:t>30/03/2022</a:t>
+              <a:t>08/04/2022</a:t>
             </a:fld>
             <a:endParaRPr lang="en-PT"/>
           </a:p>
@@ -461,7 +461,7 @@
           <a:p>
             <a:fld id="{C5DAE33B-FCF7-8349-8336-02F3E321B06E}" type="datetimeFigureOut">
               <a:rPr lang="en-PT" smtClean="0"/>
-              <a:t>30/03/2022</a:t>
+              <a:t>08/04/2022</a:t>
             </a:fld>
             <a:endParaRPr lang="en-PT"/>
           </a:p>
@@ -671,7 +671,7 @@
           <a:p>
             <a:fld id="{C5DAE33B-FCF7-8349-8336-02F3E321B06E}" type="datetimeFigureOut">
               <a:rPr lang="en-PT" smtClean="0"/>
-              <a:t>30/03/2022</a:t>
+              <a:t>08/04/2022</a:t>
             </a:fld>
             <a:endParaRPr lang="en-PT"/>
           </a:p>
@@ -871,7 +871,7 @@
           <a:p>
             <a:fld id="{C5DAE33B-FCF7-8349-8336-02F3E321B06E}" type="datetimeFigureOut">
               <a:rPr lang="en-PT" smtClean="0"/>
-              <a:t>30/03/2022</a:t>
+              <a:t>08/04/2022</a:t>
             </a:fld>
             <a:endParaRPr lang="en-PT"/>
           </a:p>
@@ -1147,7 +1147,7 @@
           <a:p>
             <a:fld id="{C5DAE33B-FCF7-8349-8336-02F3E321B06E}" type="datetimeFigureOut">
               <a:rPr lang="en-PT" smtClean="0"/>
-              <a:t>30/03/2022</a:t>
+              <a:t>08/04/2022</a:t>
             </a:fld>
             <a:endParaRPr lang="en-PT"/>
           </a:p>
@@ -1415,7 +1415,7 @@
           <a:p>
             <a:fld id="{C5DAE33B-FCF7-8349-8336-02F3E321B06E}" type="datetimeFigureOut">
               <a:rPr lang="en-PT" smtClean="0"/>
-              <a:t>30/03/2022</a:t>
+              <a:t>08/04/2022</a:t>
             </a:fld>
             <a:endParaRPr lang="en-PT"/>
           </a:p>
@@ -1830,7 +1830,7 @@
           <a:p>
             <a:fld id="{C5DAE33B-FCF7-8349-8336-02F3E321B06E}" type="datetimeFigureOut">
               <a:rPr lang="en-PT" smtClean="0"/>
-              <a:t>30/03/2022</a:t>
+              <a:t>08/04/2022</a:t>
             </a:fld>
             <a:endParaRPr lang="en-PT"/>
           </a:p>
@@ -1972,7 +1972,7 @@
           <a:p>
             <a:fld id="{C5DAE33B-FCF7-8349-8336-02F3E321B06E}" type="datetimeFigureOut">
               <a:rPr lang="en-PT" smtClean="0"/>
-              <a:t>30/03/2022</a:t>
+              <a:t>08/04/2022</a:t>
             </a:fld>
             <a:endParaRPr lang="en-PT"/>
           </a:p>
@@ -2085,7 +2085,7 @@
           <a:p>
             <a:fld id="{C5DAE33B-FCF7-8349-8336-02F3E321B06E}" type="datetimeFigureOut">
               <a:rPr lang="en-PT" smtClean="0"/>
-              <a:t>30/03/2022</a:t>
+              <a:t>08/04/2022</a:t>
             </a:fld>
             <a:endParaRPr lang="en-PT"/>
           </a:p>
@@ -2398,7 +2398,7 @@
           <a:p>
             <a:fld id="{C5DAE33B-FCF7-8349-8336-02F3E321B06E}" type="datetimeFigureOut">
               <a:rPr lang="en-PT" smtClean="0"/>
-              <a:t>30/03/2022</a:t>
+              <a:t>08/04/2022</a:t>
             </a:fld>
             <a:endParaRPr lang="en-PT"/>
           </a:p>
@@ -2687,7 +2687,7 @@
           <a:p>
             <a:fld id="{C5DAE33B-FCF7-8349-8336-02F3E321B06E}" type="datetimeFigureOut">
               <a:rPr lang="en-PT" smtClean="0"/>
-              <a:t>30/03/2022</a:t>
+              <a:t>08/04/2022</a:t>
             </a:fld>
             <a:endParaRPr lang="en-PT"/>
           </a:p>
@@ -2930,7 +2930,7 @@
           <a:p>
             <a:fld id="{C5DAE33B-FCF7-8349-8336-02F3E321B06E}" type="datetimeFigureOut">
               <a:rPr lang="en-PT" smtClean="0"/>
-              <a:t>30/03/2022</a:t>
+              <a:t>08/04/2022</a:t>
             </a:fld>
             <a:endParaRPr lang="en-PT"/>
           </a:p>
@@ -3349,10 +3349,10 @@
       </p:grpSpPr>
       <p:sp>
         <p:nvSpPr>
-          <p:cNvPr id="13" name="Rectangle 12">
-            <a:extLst>
-              <a:ext uri="{FF2B5EF4-FFF2-40B4-BE49-F238E27FC236}">
-                <a16:creationId xmlns:a16="http://schemas.microsoft.com/office/drawing/2014/main" id="{CB3097B9-D51F-0D49-BA96-00AE76BFA454}"/>
+          <p:cNvPr id="155" name="Rectangle 154">
+            <a:extLst>
+              <a:ext uri="{FF2B5EF4-FFF2-40B4-BE49-F238E27FC236}">
+                <a16:creationId xmlns:a16="http://schemas.microsoft.com/office/drawing/2014/main" id="{2DD699A6-C1BC-9D4C-9B59-2A75D77A8F7E}"/>
               </a:ext>
             </a:extLst>
           </p:cNvPr>
@@ -3361,8 +3361,8 @@
         </p:nvSpPr>
         <p:spPr>
           <a:xfrm>
-            <a:off x="4498747" y="154223"/>
-            <a:ext cx="1897402" cy="1839311"/>
+            <a:off x="4231282" y="4830808"/>
+            <a:ext cx="1391616" cy="1535608"/>
           </a:xfrm>
           <a:prstGeom prst="rect">
             <a:avLst/>
@@ -3387,16 +3387,16 @@
           <a:lstStyle/>
           <a:p>
             <a:pPr algn="ctr"/>
-            <a:endParaRPr lang="en-PT" dirty="0"/>
-          </a:p>
-        </p:txBody>
-      </p:sp>
-      <p:sp>
-        <p:nvSpPr>
-          <p:cNvPr id="4" name="Rectangle 3">
-            <a:extLst>
-              <a:ext uri="{FF2B5EF4-FFF2-40B4-BE49-F238E27FC236}">
-                <a16:creationId xmlns:a16="http://schemas.microsoft.com/office/drawing/2014/main" id="{5F46465B-DEF9-D649-88A2-D5338AE37D01}"/>
+            <a:endParaRPr lang="en-PT"/>
+          </a:p>
+        </p:txBody>
+      </p:sp>
+      <p:sp>
+        <p:nvSpPr>
+          <p:cNvPr id="13" name="Rectangle 12">
+            <a:extLst>
+              <a:ext uri="{FF2B5EF4-FFF2-40B4-BE49-F238E27FC236}">
+                <a16:creationId xmlns:a16="http://schemas.microsoft.com/office/drawing/2014/main" id="{CB3097B9-D51F-0D49-BA96-00AE76BFA454}"/>
               </a:ext>
             </a:extLst>
           </p:cNvPr>
@@ -3405,8 +3405,8 @@
         </p:nvSpPr>
         <p:spPr>
           <a:xfrm>
-            <a:off x="5585648" y="5306979"/>
-            <a:ext cx="1897402" cy="1138848"/>
+            <a:off x="3940035" y="94185"/>
+            <a:ext cx="1897402" cy="1476375"/>
           </a:xfrm>
           <a:prstGeom prst="rect">
             <a:avLst/>
@@ -3431,7 +3431,7 @@
           <a:lstStyle/>
           <a:p>
             <a:pPr algn="ctr"/>
-            <a:endParaRPr lang="en-PT"/>
+            <a:endParaRPr lang="en-PT" dirty="0"/>
           </a:p>
         </p:txBody>
       </p:sp>
@@ -3449,8 +3449,8 @@
         </p:nvSpPr>
         <p:spPr>
           <a:xfrm>
-            <a:off x="5559658" y="5310873"/>
-            <a:ext cx="1902742" cy="307777"/>
+            <a:off x="4231282" y="4823503"/>
+            <a:ext cx="1391616" cy="307777"/>
           </a:xfrm>
           <a:prstGeom prst="rect">
             <a:avLst/>
@@ -3486,8 +3486,8 @@
         </p:nvSpPr>
         <p:spPr>
           <a:xfrm>
-            <a:off x="4498747" y="2502316"/>
-            <a:ext cx="1897402" cy="1591344"/>
+            <a:off x="4206007" y="2364007"/>
+            <a:ext cx="1416891" cy="1535608"/>
           </a:xfrm>
           <a:prstGeom prst="rect">
             <a:avLst/>
@@ -3530,8 +3530,8 @@
         </p:nvSpPr>
         <p:spPr>
           <a:xfrm>
-            <a:off x="4498748" y="2502316"/>
-            <a:ext cx="1897401" cy="307777"/>
+            <a:off x="4231282" y="2378614"/>
+            <a:ext cx="1366339" cy="307777"/>
           </a:xfrm>
           <a:prstGeom prst="rect">
             <a:avLst/>
@@ -3547,7 +3547,7 @@
             <a:pPr algn="ctr"/>
             <a:r>
               <a:rPr lang="pt-PT" sz="1400" dirty="0" err="1"/>
-              <a:t>fetcher</a:t>
+              <a:t>fetcher_criacao</a:t>
             </a:r>
             <a:endParaRPr lang="en-PT" sz="1400" dirty="0"/>
           </a:p>
@@ -3582,7 +3582,7 @@
         </p:blipFill>
         <p:spPr bwMode="auto">
           <a:xfrm>
-            <a:off x="4973309" y="541569"/>
+            <a:off x="4432943" y="304287"/>
             <a:ext cx="948277" cy="1340935"/>
           </a:xfrm>
           <a:prstGeom prst="rect">
@@ -3614,8 +3614,8 @@
         </p:nvSpPr>
         <p:spPr>
           <a:xfrm>
-            <a:off x="3920311" y="179801"/>
-            <a:ext cx="3065649" cy="369332"/>
+            <a:off x="3888320" y="83209"/>
+            <a:ext cx="1917127" cy="369332"/>
           </a:xfrm>
           <a:prstGeom prst="rect">
             <a:avLst/>
@@ -3650,7 +3650,7 @@
         </p:nvSpPr>
         <p:spPr>
           <a:xfrm>
-            <a:off x="5423799" y="2082085"/>
+            <a:off x="4907081" y="1794485"/>
             <a:ext cx="2048446" cy="276999"/>
           </a:xfrm>
           <a:prstGeom prst="rect">
@@ -3667,277 +3667,6 @@
             <a:r>
               <a:rPr lang="en-PT" sz="1200" dirty="0"/>
               <a:t>Fetch and change information</a:t>
-            </a:r>
-          </a:p>
-        </p:txBody>
-      </p:sp>
-      <p:sp>
-        <p:nvSpPr>
-          <p:cNvPr id="148" name="Rectangle 147">
-            <a:extLst>
-              <a:ext uri="{FF2B5EF4-FFF2-40B4-BE49-F238E27FC236}">
-                <a16:creationId xmlns:a16="http://schemas.microsoft.com/office/drawing/2014/main" id="{A1167B79-C58B-2D45-B6FA-0B8884BA7E8D}"/>
-              </a:ext>
-            </a:extLst>
-          </p:cNvPr>
-          <p:cNvSpPr/>
-          <p:nvPr/>
-        </p:nvSpPr>
-        <p:spPr>
-          <a:xfrm>
-            <a:off x="6584502" y="5846146"/>
-            <a:ext cx="715158" cy="521970"/>
-          </a:xfrm>
-          <a:prstGeom prst="rect">
-            <a:avLst/>
-          </a:prstGeom>
-        </p:spPr>
-        <p:style>
-          <a:lnRef idx="2">
-            <a:schemeClr val="dk1"/>
-          </a:lnRef>
-          <a:fillRef idx="1">
-            <a:schemeClr val="lt1"/>
-          </a:fillRef>
-          <a:effectRef idx="0">
-            <a:schemeClr val="dk1"/>
-          </a:effectRef>
-          <a:fontRef idx="minor">
-            <a:schemeClr val="dk1"/>
-          </a:fontRef>
-        </p:style>
-        <p:txBody>
-          <a:bodyPr rtlCol="0" anchor="ctr"/>
-          <a:lstStyle/>
-          <a:p>
-            <a:pPr algn="ctr"/>
-            <a:r>
-              <a:rPr lang="en-PT" sz="1200" dirty="0"/>
-              <a:t>Backend</a:t>
-            </a:r>
-          </a:p>
-        </p:txBody>
-      </p:sp>
-      <p:sp>
-        <p:nvSpPr>
-          <p:cNvPr id="155" name="Rectangle 154">
-            <a:extLst>
-              <a:ext uri="{FF2B5EF4-FFF2-40B4-BE49-F238E27FC236}">
-                <a16:creationId xmlns:a16="http://schemas.microsoft.com/office/drawing/2014/main" id="{2DD699A6-C1BC-9D4C-9B59-2A75D77A8F7E}"/>
-              </a:ext>
-            </a:extLst>
-          </p:cNvPr>
-          <p:cNvSpPr/>
-          <p:nvPr/>
-        </p:nvSpPr>
-        <p:spPr>
-          <a:xfrm>
-            <a:off x="3460547" y="5317077"/>
-            <a:ext cx="1888079" cy="1138848"/>
-          </a:xfrm>
-          <a:prstGeom prst="rect">
-            <a:avLst/>
-          </a:prstGeom>
-        </p:spPr>
-        <p:style>
-          <a:lnRef idx="2">
-            <a:schemeClr val="dk1"/>
-          </a:lnRef>
-          <a:fillRef idx="1">
-            <a:schemeClr val="lt1"/>
-          </a:fillRef>
-          <a:effectRef idx="0">
-            <a:schemeClr val="dk1"/>
-          </a:effectRef>
-          <a:fontRef idx="minor">
-            <a:schemeClr val="dk1"/>
-          </a:fontRef>
-        </p:style>
-        <p:txBody>
-          <a:bodyPr rtlCol="0" anchor="ctr"/>
-          <a:lstStyle/>
-          <a:p>
-            <a:pPr algn="ctr"/>
-            <a:endParaRPr lang="en-PT"/>
-          </a:p>
-        </p:txBody>
-      </p:sp>
-      <p:sp>
-        <p:nvSpPr>
-          <p:cNvPr id="156" name="Rectangle 155">
-            <a:extLst>
-              <a:ext uri="{FF2B5EF4-FFF2-40B4-BE49-F238E27FC236}">
-                <a16:creationId xmlns:a16="http://schemas.microsoft.com/office/drawing/2014/main" id="{E0E97698-5403-5740-A024-5D7659B4BAD0}"/>
-              </a:ext>
-            </a:extLst>
-          </p:cNvPr>
-          <p:cNvSpPr/>
-          <p:nvPr/>
-        </p:nvSpPr>
-        <p:spPr>
-          <a:xfrm>
-            <a:off x="4469532" y="5850506"/>
-            <a:ext cx="715158" cy="521970"/>
-          </a:xfrm>
-          <a:prstGeom prst="rect">
-            <a:avLst/>
-          </a:prstGeom>
-        </p:spPr>
-        <p:style>
-          <a:lnRef idx="2">
-            <a:schemeClr val="dk1"/>
-          </a:lnRef>
-          <a:fillRef idx="1">
-            <a:schemeClr val="lt1"/>
-          </a:fillRef>
-          <a:effectRef idx="0">
-            <a:schemeClr val="dk1"/>
-          </a:effectRef>
-          <a:fontRef idx="minor">
-            <a:schemeClr val="dk1"/>
-          </a:fontRef>
-        </p:style>
-        <p:txBody>
-          <a:bodyPr rtlCol="0" anchor="ctr"/>
-          <a:lstStyle/>
-          <a:p>
-            <a:pPr algn="ctr"/>
-            <a:r>
-              <a:rPr lang="en-PT" sz="1200" dirty="0"/>
-              <a:t>Backend</a:t>
-            </a:r>
-          </a:p>
-        </p:txBody>
-      </p:sp>
-      <p:sp>
-        <p:nvSpPr>
-          <p:cNvPr id="157" name="TextBox 156">
-            <a:extLst>
-              <a:ext uri="{FF2B5EF4-FFF2-40B4-BE49-F238E27FC236}">
-                <a16:creationId xmlns:a16="http://schemas.microsoft.com/office/drawing/2014/main" id="{7DC8A4D7-67D4-C240-ACB1-B43F23969AE5}"/>
-              </a:ext>
-            </a:extLst>
-          </p:cNvPr>
-          <p:cNvSpPr txBox="1"/>
-          <p:nvPr/>
-        </p:nvSpPr>
-        <p:spPr>
-          <a:xfrm>
-            <a:off x="3484150" y="5301725"/>
-            <a:ext cx="1878871" cy="307777"/>
-          </a:xfrm>
-          <a:prstGeom prst="rect">
-            <a:avLst/>
-          </a:prstGeom>
-          <a:noFill/>
-        </p:spPr>
-        <p:txBody>
-          <a:bodyPr wrap="square" rtlCol="0">
-            <a:spAutoFit/>
-          </a:bodyPr>
-          <a:lstStyle/>
-          <a:p>
-            <a:r>
-              <a:rPr lang="pt-PT" sz="1400" dirty="0" err="1"/>
-              <a:t>guest</a:t>
-            </a:r>
-            <a:r>
-              <a:rPr lang="en-PT" sz="1400" dirty="0"/>
-              <a:t>_app</a:t>
-            </a:r>
-          </a:p>
-        </p:txBody>
-      </p:sp>
-      <p:sp>
-        <p:nvSpPr>
-          <p:cNvPr id="164" name="Rectangle 163">
-            <a:extLst>
-              <a:ext uri="{FF2B5EF4-FFF2-40B4-BE49-F238E27FC236}">
-                <a16:creationId xmlns:a16="http://schemas.microsoft.com/office/drawing/2014/main" id="{2B1164D3-2A03-2F4F-840C-43EB77AFCED8}"/>
-              </a:ext>
-            </a:extLst>
-          </p:cNvPr>
-          <p:cNvSpPr/>
-          <p:nvPr/>
-        </p:nvSpPr>
-        <p:spPr>
-          <a:xfrm>
-            <a:off x="5631775" y="5840709"/>
-            <a:ext cx="810879" cy="521970"/>
-          </a:xfrm>
-          <a:prstGeom prst="rect">
-            <a:avLst/>
-          </a:prstGeom>
-        </p:spPr>
-        <p:style>
-          <a:lnRef idx="2">
-            <a:schemeClr val="dk1"/>
-          </a:lnRef>
-          <a:fillRef idx="1">
-            <a:schemeClr val="lt1"/>
-          </a:fillRef>
-          <a:effectRef idx="0">
-            <a:schemeClr val="dk1"/>
-          </a:effectRef>
-          <a:fontRef idx="minor">
-            <a:schemeClr val="dk1"/>
-          </a:fontRef>
-        </p:style>
-        <p:txBody>
-          <a:bodyPr rtlCol="0" anchor="ctr"/>
-          <a:lstStyle/>
-          <a:p>
-            <a:pPr algn="ctr"/>
-            <a:r>
-              <a:rPr lang="en-PT" sz="1200" dirty="0"/>
-              <a:t>Frontend</a:t>
-            </a:r>
-          </a:p>
-        </p:txBody>
-      </p:sp>
-      <p:sp>
-        <p:nvSpPr>
-          <p:cNvPr id="166" name="Rectangle 165">
-            <a:extLst>
-              <a:ext uri="{FF2B5EF4-FFF2-40B4-BE49-F238E27FC236}">
-                <a16:creationId xmlns:a16="http://schemas.microsoft.com/office/drawing/2014/main" id="{59BB578F-5793-3C4F-A7B9-0E064B5656B8}"/>
-              </a:ext>
-            </a:extLst>
-          </p:cNvPr>
-          <p:cNvSpPr/>
-          <p:nvPr/>
-        </p:nvSpPr>
-        <p:spPr>
-          <a:xfrm>
-            <a:off x="3533791" y="5850506"/>
-            <a:ext cx="810879" cy="521970"/>
-          </a:xfrm>
-          <a:prstGeom prst="rect">
-            <a:avLst/>
-          </a:prstGeom>
-        </p:spPr>
-        <p:style>
-          <a:lnRef idx="2">
-            <a:schemeClr val="dk1"/>
-          </a:lnRef>
-          <a:fillRef idx="1">
-            <a:schemeClr val="lt1"/>
-          </a:fillRef>
-          <a:effectRef idx="0">
-            <a:schemeClr val="dk1"/>
-          </a:effectRef>
-          <a:fontRef idx="minor">
-            <a:schemeClr val="dk1"/>
-          </a:fontRef>
-        </p:style>
-        <p:txBody>
-          <a:bodyPr rtlCol="0" anchor="ctr"/>
-          <a:lstStyle/>
-          <a:p>
-            <a:pPr algn="ctr"/>
-            <a:r>
-              <a:rPr lang="en-PT" sz="1200" dirty="0"/>
-              <a:t>Frontend</a:t>
             </a:r>
           </a:p>
         </p:txBody>
@@ -3960,8 +3689,8 @@
         </p:nvCxnSpPr>
         <p:spPr>
           <a:xfrm rot="16200000" flipV="1">
-            <a:off x="5370633" y="4170476"/>
-            <a:ext cx="1217213" cy="1063581"/>
+            <a:off x="4458828" y="4355240"/>
+            <a:ext cx="923888" cy="12637"/>
           </a:xfrm>
           <a:prstGeom prst="bentConnector3">
             <a:avLst/>
@@ -3988,69 +3717,23 @@
       </p:cxnSp>
       <p:cxnSp>
         <p:nvCxnSpPr>
-          <p:cNvPr id="179" name="Elbow Connector 178">
-            <a:extLst>
-              <a:ext uri="{FF2B5EF4-FFF2-40B4-BE49-F238E27FC236}">
-                <a16:creationId xmlns:a16="http://schemas.microsoft.com/office/drawing/2014/main" id="{6BF59C95-0435-0E4E-A1FD-1864684A3B9E}"/>
+          <p:cNvPr id="181" name="Straight Arrow Connector 180">
+            <a:extLst>
+              <a:ext uri="{FF2B5EF4-FFF2-40B4-BE49-F238E27FC236}">
+                <a16:creationId xmlns:a16="http://schemas.microsoft.com/office/drawing/2014/main" id="{780C58D1-CB4F-F74F-ABEF-C9F5A2D9A4CF}"/>
               </a:ext>
             </a:extLst>
           </p:cNvPr>
           <p:cNvCxnSpPr>
             <a:cxnSpLocks/>
-            <a:stCxn id="157" idx="0"/>
-            <a:endCxn id="10" idx="2"/>
-          </p:cNvCxnSpPr>
-          <p:nvPr/>
-        </p:nvCxnSpPr>
-        <p:spPr>
-          <a:xfrm rot="5400000" flipH="1" flipV="1">
-            <a:off x="4331485" y="4185762"/>
-            <a:ext cx="1208065" cy="1023862"/>
-          </a:xfrm>
-          <a:prstGeom prst="bentConnector3">
-            <a:avLst>
-              <a:gd name="adj1" fmla="val 50000"/>
-            </a:avLst>
-          </a:prstGeom>
-          <a:ln>
-            <a:headEnd type="triangle"/>
-            <a:tailEnd type="triangle"/>
-          </a:ln>
-        </p:spPr>
-        <p:style>
-          <a:lnRef idx="1">
-            <a:schemeClr val="accent1"/>
-          </a:lnRef>
-          <a:fillRef idx="0">
-            <a:schemeClr val="accent1"/>
-          </a:fillRef>
-          <a:effectRef idx="0">
-            <a:schemeClr val="accent1"/>
-          </a:effectRef>
-          <a:fontRef idx="minor">
-            <a:schemeClr val="tx1"/>
-          </a:fontRef>
-        </p:style>
-      </p:cxnSp>
-      <p:cxnSp>
-        <p:nvCxnSpPr>
-          <p:cNvPr id="181" name="Straight Arrow Connector 180">
-            <a:extLst>
-              <a:ext uri="{FF2B5EF4-FFF2-40B4-BE49-F238E27FC236}">
-                <a16:creationId xmlns:a16="http://schemas.microsoft.com/office/drawing/2014/main" id="{780C58D1-CB4F-F74F-ABEF-C9F5A2D9A4CF}"/>
-              </a:ext>
-            </a:extLst>
-          </p:cNvPr>
-          <p:cNvCxnSpPr>
-            <a:cxnSpLocks/>
-            <a:endCxn id="11" idx="0"/>
+            <a:endCxn id="10" idx="0"/>
           </p:cNvCxnSpPr>
           <p:nvPr/>
         </p:nvCxnSpPr>
         <p:spPr>
           <a:xfrm>
-            <a:off x="5447449" y="1993534"/>
-            <a:ext cx="0" cy="508782"/>
+            <a:off x="4914453" y="1439718"/>
+            <a:ext cx="0" cy="924289"/>
           </a:xfrm>
           <a:prstGeom prst="straightConnector1">
             <a:avLst/>
@@ -4089,7 +3772,7 @@
         </p:nvSpPr>
         <p:spPr>
           <a:xfrm>
-            <a:off x="4687427" y="3008762"/>
+            <a:off x="4556182" y="2919495"/>
             <a:ext cx="716540" cy="840475"/>
           </a:xfrm>
           <a:prstGeom prst="rect">
@@ -4122,12 +3805,59 @@
           </a:p>
         </p:txBody>
       </p:sp>
-      <p:sp>
-        <p:nvSpPr>
-          <p:cNvPr id="22" name="Rectangle 21">
-            <a:extLst>
-              <a:ext uri="{FF2B5EF4-FFF2-40B4-BE49-F238E27FC236}">
-                <a16:creationId xmlns:a16="http://schemas.microsoft.com/office/drawing/2014/main" id="{93CA8A41-A181-9D4D-9BBC-D36730A9F47C}"/>
+      <p:pic>
+        <p:nvPicPr>
+          <p:cNvPr id="29" name="Picture 2" descr="An Intro to React and React Native - Wildix Blog">
+            <a:extLst>
+              <a:ext uri="{FF2B5EF4-FFF2-40B4-BE49-F238E27FC236}">
+                <a16:creationId xmlns:a16="http://schemas.microsoft.com/office/drawing/2014/main" id="{A51ABA36-E5E7-204E-966C-75E49C115A4B}"/>
+              </a:ext>
+            </a:extLst>
+          </p:cNvPr>
+          <p:cNvPicPr>
+            <a:picLocks noChangeAspect="1" noChangeArrowheads="1"/>
+          </p:cNvPicPr>
+          <p:nvPr/>
+        </p:nvPicPr>
+        <p:blipFill>
+          <a:blip r:embed="rId3">
+            <a:extLst>
+              <a:ext uri="{28A0092B-C50C-407E-A947-70E740481C1C}">
+                <a14:useLocalDpi xmlns:a14="http://schemas.microsoft.com/office/drawing/2010/main" val="0"/>
+              </a:ext>
+            </a:extLst>
+          </a:blip>
+          <a:srcRect/>
+          <a:stretch>
+            <a:fillRect/>
+          </a:stretch>
+        </p:blipFill>
+        <p:spPr bwMode="auto">
+          <a:xfrm>
+            <a:off x="4433569" y="5306087"/>
+            <a:ext cx="1055461" cy="643456"/>
+          </a:xfrm>
+          <a:prstGeom prst="rect">
+            <a:avLst/>
+          </a:prstGeom>
+          <a:noFill/>
+          <a:extLst>
+            <a:ext uri="{909E8E84-426E-40DD-AFC4-6F175D3DCCD1}">
+              <a14:hiddenFill xmlns:a14="http://schemas.microsoft.com/office/drawing/2010/main">
+                <a:solidFill>
+                  <a:srgbClr val="FFFFFF"/>
+                </a:solidFill>
+              </a14:hiddenFill>
+            </a:ext>
+          </a:extLst>
+        </p:spPr>
+      </p:pic>
+      <p:sp>
+        <p:nvSpPr>
+          <p:cNvPr id="46" name="Rectangle 45">
+            <a:extLst>
+              <a:ext uri="{FF2B5EF4-FFF2-40B4-BE49-F238E27FC236}">
+                <a16:creationId xmlns:a16="http://schemas.microsoft.com/office/drawing/2014/main" id="{DF95BD5E-AAD4-2A46-B197-8A957A90C7A3}"/>
               </a:ext>
             </a:extLst>
           </p:cNvPr>
@@ -4136,7 +3866,88 @@
         </p:nvSpPr>
         <p:spPr>
           <a:xfrm>
-            <a:off x="5543238" y="3008762"/>
+            <a:off x="6184961" y="2364007"/>
+            <a:ext cx="1416891" cy="1535608"/>
+          </a:xfrm>
+          <a:prstGeom prst="rect">
+            <a:avLst/>
+          </a:prstGeom>
+        </p:spPr>
+        <p:style>
+          <a:lnRef idx="2">
+            <a:schemeClr val="dk1"/>
+          </a:lnRef>
+          <a:fillRef idx="1">
+            <a:schemeClr val="lt1"/>
+          </a:fillRef>
+          <a:effectRef idx="0">
+            <a:schemeClr val="dk1"/>
+          </a:effectRef>
+          <a:fontRef idx="minor">
+            <a:schemeClr val="dk1"/>
+          </a:fontRef>
+        </p:style>
+        <p:txBody>
+          <a:bodyPr rtlCol="0" anchor="ctr"/>
+          <a:lstStyle/>
+          <a:p>
+            <a:pPr algn="ctr"/>
+            <a:endParaRPr lang="en-PT" dirty="0"/>
+          </a:p>
+        </p:txBody>
+      </p:sp>
+      <p:sp>
+        <p:nvSpPr>
+          <p:cNvPr id="47" name="TextBox 46">
+            <a:extLst>
+              <a:ext uri="{FF2B5EF4-FFF2-40B4-BE49-F238E27FC236}">
+                <a16:creationId xmlns:a16="http://schemas.microsoft.com/office/drawing/2014/main" id="{6656F5E7-8800-E348-B918-2BD6821D5F2B}"/>
+              </a:ext>
+            </a:extLst>
+          </p:cNvPr>
+          <p:cNvSpPr txBox="1"/>
+          <p:nvPr/>
+        </p:nvSpPr>
+        <p:spPr>
+          <a:xfrm>
+            <a:off x="6210236" y="2378614"/>
+            <a:ext cx="1366339" cy="307777"/>
+          </a:xfrm>
+          <a:prstGeom prst="rect">
+            <a:avLst/>
+          </a:prstGeom>
+          <a:noFill/>
+        </p:spPr>
+        <p:txBody>
+          <a:bodyPr wrap="square" rtlCol="0">
+            <a:spAutoFit/>
+          </a:bodyPr>
+          <a:lstStyle/>
+          <a:p>
+            <a:pPr algn="ctr"/>
+            <a:r>
+              <a:rPr lang="pt-PT" sz="1400" dirty="0" err="1"/>
+              <a:t>fetcher_edicao</a:t>
+            </a:r>
+            <a:endParaRPr lang="en-PT" sz="1400" dirty="0"/>
+          </a:p>
+        </p:txBody>
+      </p:sp>
+      <p:sp>
+        <p:nvSpPr>
+          <p:cNvPr id="48" name="Rectangle 47">
+            <a:extLst>
+              <a:ext uri="{FF2B5EF4-FFF2-40B4-BE49-F238E27FC236}">
+                <a16:creationId xmlns:a16="http://schemas.microsoft.com/office/drawing/2014/main" id="{FB881DE1-6008-2A43-BEDD-79A880FD684B}"/>
+              </a:ext>
+            </a:extLst>
+          </p:cNvPr>
+          <p:cNvSpPr/>
+          <p:nvPr/>
+        </p:nvSpPr>
+        <p:spPr>
+          <a:xfrm>
+            <a:off x="6535136" y="2919495"/>
             <a:ext cx="716540" cy="840475"/>
           </a:xfrm>
           <a:prstGeom prst="rect">
@@ -4164,35 +3975,206 @@
             <a:pPr algn="ctr"/>
             <a:r>
               <a:rPr lang="en-PT" sz="1200" dirty="0"/>
-              <a:t>Broker</a:t>
+              <a:t>API</a:t>
+            </a:r>
+          </a:p>
+        </p:txBody>
+      </p:sp>
+      <p:sp>
+        <p:nvSpPr>
+          <p:cNvPr id="49" name="Rectangle 48">
+            <a:extLst>
+              <a:ext uri="{FF2B5EF4-FFF2-40B4-BE49-F238E27FC236}">
+                <a16:creationId xmlns:a16="http://schemas.microsoft.com/office/drawing/2014/main" id="{08254E46-FC6F-984D-8D41-9CE00FEBAEB1}"/>
+              </a:ext>
+            </a:extLst>
+          </p:cNvPr>
+          <p:cNvSpPr/>
+          <p:nvPr/>
+        </p:nvSpPr>
+        <p:spPr>
+          <a:xfrm>
+            <a:off x="2307098" y="2364006"/>
+            <a:ext cx="1416891" cy="1535608"/>
+          </a:xfrm>
+          <a:prstGeom prst="rect">
+            <a:avLst/>
+          </a:prstGeom>
+        </p:spPr>
+        <p:style>
+          <a:lnRef idx="2">
+            <a:schemeClr val="dk1"/>
+          </a:lnRef>
+          <a:fillRef idx="1">
+            <a:schemeClr val="lt1"/>
+          </a:fillRef>
+          <a:effectRef idx="0">
+            <a:schemeClr val="dk1"/>
+          </a:effectRef>
+          <a:fontRef idx="minor">
+            <a:schemeClr val="dk1"/>
+          </a:fontRef>
+        </p:style>
+        <p:txBody>
+          <a:bodyPr rtlCol="0" anchor="ctr"/>
+          <a:lstStyle/>
+          <a:p>
+            <a:pPr algn="ctr"/>
+            <a:endParaRPr lang="en-PT" dirty="0"/>
+          </a:p>
+        </p:txBody>
+      </p:sp>
+      <p:sp>
+        <p:nvSpPr>
+          <p:cNvPr id="50" name="TextBox 49">
+            <a:extLst>
+              <a:ext uri="{FF2B5EF4-FFF2-40B4-BE49-F238E27FC236}">
+                <a16:creationId xmlns:a16="http://schemas.microsoft.com/office/drawing/2014/main" id="{3C8E3FB0-EBD2-F943-9296-074A2934C79D}"/>
+              </a:ext>
+            </a:extLst>
+          </p:cNvPr>
+          <p:cNvSpPr txBox="1"/>
+          <p:nvPr/>
+        </p:nvSpPr>
+        <p:spPr>
+          <a:xfrm>
+            <a:off x="2332373" y="2378613"/>
+            <a:ext cx="1366339" cy="307777"/>
+          </a:xfrm>
+          <a:prstGeom prst="rect">
+            <a:avLst/>
+          </a:prstGeom>
+          <a:noFill/>
+        </p:spPr>
+        <p:txBody>
+          <a:bodyPr wrap="square" rtlCol="0">
+            <a:spAutoFit/>
+          </a:bodyPr>
+          <a:lstStyle/>
+          <a:p>
+            <a:pPr algn="ctr"/>
+            <a:r>
+              <a:rPr lang="pt-PT" sz="1400" dirty="0" err="1"/>
+              <a:t>fetcher_search</a:t>
+            </a:r>
+            <a:endParaRPr lang="en-PT" sz="1400" dirty="0"/>
+          </a:p>
+        </p:txBody>
+      </p:sp>
+      <p:sp>
+        <p:nvSpPr>
+          <p:cNvPr id="51" name="Rectangle 50">
+            <a:extLst>
+              <a:ext uri="{FF2B5EF4-FFF2-40B4-BE49-F238E27FC236}">
+                <a16:creationId xmlns:a16="http://schemas.microsoft.com/office/drawing/2014/main" id="{74EF6690-6C47-5047-A5AD-2665EB9F9E73}"/>
+              </a:ext>
+            </a:extLst>
+          </p:cNvPr>
+          <p:cNvSpPr/>
+          <p:nvPr/>
+        </p:nvSpPr>
+        <p:spPr>
+          <a:xfrm>
+            <a:off x="2657273" y="2919494"/>
+            <a:ext cx="716540" cy="840475"/>
+          </a:xfrm>
+          <a:prstGeom prst="rect">
+            <a:avLst/>
+          </a:prstGeom>
+        </p:spPr>
+        <p:style>
+          <a:lnRef idx="2">
+            <a:schemeClr val="dk1"/>
+          </a:lnRef>
+          <a:fillRef idx="1">
+            <a:schemeClr val="lt1"/>
+          </a:fillRef>
+          <a:effectRef idx="0">
+            <a:schemeClr val="dk1"/>
+          </a:effectRef>
+          <a:fontRef idx="minor">
+            <a:schemeClr val="dk1"/>
+          </a:fontRef>
+        </p:style>
+        <p:txBody>
+          <a:bodyPr rtlCol="0" anchor="ctr"/>
+          <a:lstStyle/>
+          <a:p>
+            <a:pPr algn="ctr"/>
+            <a:r>
+              <a:rPr lang="en-PT" sz="1200" dirty="0"/>
+              <a:t>API</a:t>
             </a:r>
           </a:p>
         </p:txBody>
       </p:sp>
       <p:cxnSp>
         <p:nvCxnSpPr>
-          <p:cNvPr id="15" name="Elbow Connector 14">
-            <a:extLst>
-              <a:ext uri="{FF2B5EF4-FFF2-40B4-BE49-F238E27FC236}">
-                <a16:creationId xmlns:a16="http://schemas.microsoft.com/office/drawing/2014/main" id="{71F9C06B-FBD0-9A4F-A538-9EBA240A403D}"/>
+          <p:cNvPr id="38" name="Elbow Connector 37">
+            <a:extLst>
+              <a:ext uri="{FF2B5EF4-FFF2-40B4-BE49-F238E27FC236}">
+                <a16:creationId xmlns:a16="http://schemas.microsoft.com/office/drawing/2014/main" id="{A40BFE58-A44D-3148-BFD0-88D53052515E}"/>
               </a:ext>
             </a:extLst>
           </p:cNvPr>
           <p:cNvCxnSpPr>
-            <a:stCxn id="56" idx="0"/>
-            <a:endCxn id="22" idx="0"/>
+            <a:cxnSpLocks/>
+            <a:stCxn id="5" idx="0"/>
+            <a:endCxn id="46" idx="2"/>
           </p:cNvCxnSpPr>
           <p:nvPr/>
         </p:nvCxnSpPr>
         <p:spPr>
           <a:xfrm rot="5400000" flipH="1" flipV="1">
-            <a:off x="5473602" y="2580857"/>
-            <a:ext cx="12700" cy="855811"/>
+            <a:off x="5448304" y="3378401"/>
+            <a:ext cx="923888" cy="1966317"/>
           </a:xfrm>
           <a:prstGeom prst="bentConnector3">
-            <a:avLst>
-              <a:gd name="adj1" fmla="val 1800000"/>
-            </a:avLst>
+            <a:avLst/>
+          </a:prstGeom>
+          <a:ln>
+            <a:headEnd type="triangle"/>
+            <a:tailEnd type="triangle"/>
+          </a:ln>
+        </p:spPr>
+        <p:style>
+          <a:lnRef idx="1">
+            <a:schemeClr val="accent1"/>
+          </a:lnRef>
+          <a:fillRef idx="0">
+            <a:schemeClr val="accent1"/>
+          </a:fillRef>
+          <a:effectRef idx="0">
+            <a:schemeClr val="accent1"/>
+          </a:effectRef>
+          <a:fontRef idx="minor">
+            <a:schemeClr val="tx1"/>
+          </a:fontRef>
+        </p:style>
+      </p:cxnSp>
+      <p:cxnSp>
+        <p:nvCxnSpPr>
+          <p:cNvPr id="40" name="Elbow Connector 39">
+            <a:extLst>
+              <a:ext uri="{FF2B5EF4-FFF2-40B4-BE49-F238E27FC236}">
+                <a16:creationId xmlns:a16="http://schemas.microsoft.com/office/drawing/2014/main" id="{67236929-82C7-3442-AD01-59476B2C5BD9}"/>
+              </a:ext>
+            </a:extLst>
+          </p:cNvPr>
+          <p:cNvCxnSpPr>
+            <a:cxnSpLocks/>
+            <a:stCxn id="5" idx="0"/>
+            <a:endCxn id="49" idx="2"/>
+          </p:cNvCxnSpPr>
+          <p:nvPr/>
+        </p:nvCxnSpPr>
+        <p:spPr>
+          <a:xfrm rot="16200000" flipV="1">
+            <a:off x="3509373" y="3405786"/>
+            <a:ext cx="923889" cy="1911546"/>
+          </a:xfrm>
+          <a:prstGeom prst="bentConnector3">
+            <a:avLst/>
           </a:prstGeom>
           <a:ln>
             <a:headEnd type="triangle"/>

</xml_diff>